<commit_message>
FEAT: CV/ViT/ViT_CIFAR10.py ViT 모델 코드 작성
</commit_message>
<xml_diff>
--- a/CV/ViT/사용환경_구조.pptx
+++ b/CV/ViT/사용환경_구조.pptx
@@ -9673,276 +9673,6 @@
           <a:chExt cx="0" cy="0"/>
         </a:xfrm>
       </p:grpSpPr>
-      <p:sp>
-        <p:nvSpPr>
-          <p:cNvPr id="23" name="사각형: 둥근 모서리 22">
-            <a:extLst>
-              <a:ext uri="{FF2B5EF4-FFF2-40B4-BE49-F238E27FC236}">
-                <a16:creationId xmlns:a16="http://schemas.microsoft.com/office/drawing/2014/main" id="{150B6F32-4CB7-3407-505A-4BE58157FC9E}"/>
-              </a:ext>
-            </a:extLst>
-          </p:cNvPr>
-          <p:cNvSpPr/>
-          <p:nvPr/>
-        </p:nvSpPr>
-        <p:spPr>
-          <a:xfrm>
-            <a:off x="4737322" y="1446458"/>
-            <a:ext cx="1777779" cy="1435535"/>
-          </a:xfrm>
-          <a:prstGeom prst="roundRect">
-            <a:avLst/>
-          </a:prstGeom>
-          <a:solidFill>
-            <a:schemeClr val="accent5">
-              <a:lumMod val="75000"/>
-            </a:schemeClr>
-          </a:solidFill>
-          <a:ln>
-            <a:noFill/>
-          </a:ln>
-        </p:spPr>
-        <p:style>
-          <a:lnRef idx="2">
-            <a:schemeClr val="accent1">
-              <a:shade val="15000"/>
-            </a:schemeClr>
-          </a:lnRef>
-          <a:fillRef idx="1">
-            <a:schemeClr val="accent1"/>
-          </a:fillRef>
-          <a:effectRef idx="0">
-            <a:schemeClr val="accent1"/>
-          </a:effectRef>
-          <a:fontRef idx="minor">
-            <a:schemeClr val="lt1"/>
-          </a:fontRef>
-        </p:style>
-        <p:txBody>
-          <a:bodyPr rtlCol="0" anchor="ctr"/>
-          <a:lstStyle/>
-          <a:p>
-            <a:pPr algn="ctr"/>
-            <a:endParaRPr lang="ko-KR" altLang="en-US"/>
-          </a:p>
-        </p:txBody>
-      </p:sp>
-      <p:sp>
-        <p:nvSpPr>
-          <p:cNvPr id="19" name="사각형: 둥근 모서리 18">
-            <a:extLst>
-              <a:ext uri="{FF2B5EF4-FFF2-40B4-BE49-F238E27FC236}">
-                <a16:creationId xmlns:a16="http://schemas.microsoft.com/office/drawing/2014/main" id="{E348E483-C6FD-C06C-25C3-5AEA8BFBC63C}"/>
-              </a:ext>
-            </a:extLst>
-          </p:cNvPr>
-          <p:cNvSpPr/>
-          <p:nvPr/>
-        </p:nvSpPr>
-        <p:spPr>
-          <a:xfrm>
-            <a:off x="3692303" y="4170571"/>
-            <a:ext cx="1777779" cy="1240971"/>
-          </a:xfrm>
-          <a:prstGeom prst="roundRect">
-            <a:avLst/>
-          </a:prstGeom>
-          <a:solidFill>
-            <a:schemeClr val="accent5">
-              <a:lumMod val="60000"/>
-              <a:lumOff val="40000"/>
-            </a:schemeClr>
-          </a:solidFill>
-          <a:ln>
-            <a:noFill/>
-          </a:ln>
-        </p:spPr>
-        <p:style>
-          <a:lnRef idx="2">
-            <a:schemeClr val="accent1">
-              <a:shade val="15000"/>
-            </a:schemeClr>
-          </a:lnRef>
-          <a:fillRef idx="1">
-            <a:schemeClr val="accent1"/>
-          </a:fillRef>
-          <a:effectRef idx="0">
-            <a:schemeClr val="accent1"/>
-          </a:effectRef>
-          <a:fontRef idx="minor">
-            <a:schemeClr val="lt1"/>
-          </a:fontRef>
-        </p:style>
-        <p:txBody>
-          <a:bodyPr rtlCol="0" anchor="ctr"/>
-          <a:lstStyle/>
-          <a:p>
-            <a:pPr algn="ctr"/>
-            <a:endParaRPr lang="ko-KR" altLang="en-US"/>
-          </a:p>
-        </p:txBody>
-      </p:sp>
-      <p:sp>
-        <p:nvSpPr>
-          <p:cNvPr id="20" name="TextBox 19">
-            <a:extLst>
-              <a:ext uri="{FF2B5EF4-FFF2-40B4-BE49-F238E27FC236}">
-                <a16:creationId xmlns:a16="http://schemas.microsoft.com/office/drawing/2014/main" id="{145C3A56-313F-6738-312A-0C13EEE613F3}"/>
-              </a:ext>
-            </a:extLst>
-          </p:cNvPr>
-          <p:cNvSpPr txBox="1"/>
-          <p:nvPr/>
-        </p:nvSpPr>
-        <p:spPr>
-          <a:xfrm>
-            <a:off x="4030102" y="5411542"/>
-            <a:ext cx="1102179" cy="338554"/>
-          </a:xfrm>
-          <a:prstGeom prst="rect">
-            <a:avLst/>
-          </a:prstGeom>
-          <a:noFill/>
-        </p:spPr>
-        <p:txBody>
-          <a:bodyPr wrap="square" rtlCol="0">
-            <a:spAutoFit/>
-          </a:bodyPr>
-          <a:lstStyle/>
-          <a:p>
-            <a:pPr algn="ctr"/>
-            <a:r>
-              <a:rPr lang="en-US" altLang="ko-KR" sz="1600" dirty="0">
-                <a:solidFill>
-                  <a:srgbClr val="C00000"/>
-                </a:solidFill>
-                <a:latin typeface="KoPubWorld돋움체_Pro Bold" panose="00000800000000000000" pitchFamily="50" charset="-127"/>
-                <a:ea typeface="KoPubWorld돋움체_Pro Bold" panose="00000800000000000000" pitchFamily="50" charset="-127"/>
-                <a:cs typeface="KoPubWorld돋움체_Pro Bold" panose="00000800000000000000" pitchFamily="50" charset="-127"/>
-              </a:rPr>
-              <a:t>Phase 3</a:t>
-            </a:r>
-            <a:endParaRPr lang="ko-KR" altLang="en-US" sz="1600" dirty="0">
-              <a:solidFill>
-                <a:srgbClr val="C00000"/>
-              </a:solidFill>
-              <a:latin typeface="KoPubWorld돋움체_Pro Bold" panose="00000800000000000000" pitchFamily="50" charset="-127"/>
-              <a:ea typeface="KoPubWorld돋움체_Pro Bold" panose="00000800000000000000" pitchFamily="50" charset="-127"/>
-              <a:cs typeface="KoPubWorld돋움체_Pro Bold" panose="00000800000000000000" pitchFamily="50" charset="-127"/>
-            </a:endParaRPr>
-          </a:p>
-        </p:txBody>
-      </p:sp>
-      <p:sp>
-        <p:nvSpPr>
-          <p:cNvPr id="17" name="사각형: 둥근 모서리 16">
-            <a:extLst>
-              <a:ext uri="{FF2B5EF4-FFF2-40B4-BE49-F238E27FC236}">
-                <a16:creationId xmlns:a16="http://schemas.microsoft.com/office/drawing/2014/main" id="{15FA632F-0186-D1EA-EC9B-28B27800A444}"/>
-              </a:ext>
-            </a:extLst>
-          </p:cNvPr>
-          <p:cNvSpPr/>
-          <p:nvPr/>
-        </p:nvSpPr>
-        <p:spPr>
-          <a:xfrm>
-            <a:off x="1593053" y="4170571"/>
-            <a:ext cx="1777779" cy="1240971"/>
-          </a:xfrm>
-          <a:prstGeom prst="roundRect">
-            <a:avLst/>
-          </a:prstGeom>
-          <a:solidFill>
-            <a:schemeClr val="accent5">
-              <a:lumMod val="40000"/>
-              <a:lumOff val="60000"/>
-            </a:schemeClr>
-          </a:solidFill>
-          <a:ln>
-            <a:noFill/>
-          </a:ln>
-        </p:spPr>
-        <p:style>
-          <a:lnRef idx="2">
-            <a:schemeClr val="accent1">
-              <a:shade val="15000"/>
-            </a:schemeClr>
-          </a:lnRef>
-          <a:fillRef idx="1">
-            <a:schemeClr val="accent1"/>
-          </a:fillRef>
-          <a:effectRef idx="0">
-            <a:schemeClr val="accent1"/>
-          </a:effectRef>
-          <a:fontRef idx="minor">
-            <a:schemeClr val="lt1"/>
-          </a:fontRef>
-        </p:style>
-        <p:txBody>
-          <a:bodyPr rtlCol="0" anchor="ctr"/>
-          <a:lstStyle/>
-          <a:p>
-            <a:pPr algn="ctr"/>
-            <a:endParaRPr lang="ko-KR" altLang="en-US"/>
-          </a:p>
-        </p:txBody>
-      </p:sp>
-      <p:sp>
-        <p:nvSpPr>
-          <p:cNvPr id="16" name="사각형: 둥근 모서리 15">
-            <a:extLst>
-              <a:ext uri="{FF2B5EF4-FFF2-40B4-BE49-F238E27FC236}">
-                <a16:creationId xmlns:a16="http://schemas.microsoft.com/office/drawing/2014/main" id="{F8D4ECE0-1577-9770-4E9E-F3A3C52394AB}"/>
-              </a:ext>
-            </a:extLst>
-          </p:cNvPr>
-          <p:cNvSpPr/>
-          <p:nvPr/>
-        </p:nvSpPr>
-        <p:spPr>
-          <a:xfrm>
-            <a:off x="696000" y="1641022"/>
-            <a:ext cx="1777779" cy="1240971"/>
-          </a:xfrm>
-          <a:prstGeom prst="roundRect">
-            <a:avLst/>
-          </a:prstGeom>
-          <a:solidFill>
-            <a:schemeClr val="accent5">
-              <a:lumMod val="20000"/>
-              <a:lumOff val="80000"/>
-            </a:schemeClr>
-          </a:solidFill>
-          <a:ln>
-            <a:noFill/>
-          </a:ln>
-        </p:spPr>
-        <p:style>
-          <a:lnRef idx="2">
-            <a:schemeClr val="accent1">
-              <a:shade val="15000"/>
-            </a:schemeClr>
-          </a:lnRef>
-          <a:fillRef idx="1">
-            <a:schemeClr val="accent1"/>
-          </a:fillRef>
-          <a:effectRef idx="0">
-            <a:schemeClr val="accent1"/>
-          </a:effectRef>
-          <a:fontRef idx="minor">
-            <a:schemeClr val="lt1"/>
-          </a:fontRef>
-        </p:style>
-        <p:txBody>
-          <a:bodyPr rtlCol="0" anchor="ctr"/>
-          <a:lstStyle/>
-          <a:p>
-            <a:pPr algn="ctr"/>
-            <a:endParaRPr lang="ko-KR" altLang="en-US"/>
-          </a:p>
-        </p:txBody>
-      </p:sp>
       <p:pic>
         <p:nvPicPr>
           <p:cNvPr id="5" name="그림 4">
@@ -9984,159 +9714,6 @@
           </a:prstGeom>
         </p:spPr>
       </p:pic>
-      <p:sp>
-        <p:nvSpPr>
-          <p:cNvPr id="9" name="TextBox 8">
-            <a:extLst>
-              <a:ext uri="{FF2B5EF4-FFF2-40B4-BE49-F238E27FC236}">
-                <a16:creationId xmlns:a16="http://schemas.microsoft.com/office/drawing/2014/main" id="{47D02FC4-9B74-3701-AB14-5D4BEBF07465}"/>
-              </a:ext>
-            </a:extLst>
-          </p:cNvPr>
-          <p:cNvSpPr txBox="1"/>
-          <p:nvPr/>
-        </p:nvSpPr>
-        <p:spPr>
-          <a:xfrm>
-            <a:off x="1033799" y="1302468"/>
-            <a:ext cx="1102179" cy="338554"/>
-          </a:xfrm>
-          <a:prstGeom prst="rect">
-            <a:avLst/>
-          </a:prstGeom>
-          <a:noFill/>
-        </p:spPr>
-        <p:txBody>
-          <a:bodyPr wrap="square" rtlCol="0">
-            <a:spAutoFit/>
-          </a:bodyPr>
-          <a:lstStyle/>
-          <a:p>
-            <a:pPr algn="ctr"/>
-            <a:r>
-              <a:rPr lang="en-US" altLang="ko-KR" sz="1600" dirty="0">
-                <a:solidFill>
-                  <a:srgbClr val="C00000"/>
-                </a:solidFill>
-                <a:latin typeface="KoPubWorld돋움체_Pro Bold" panose="00000800000000000000" pitchFamily="50" charset="-127"/>
-                <a:ea typeface="KoPubWorld돋움체_Pro Bold" panose="00000800000000000000" pitchFamily="50" charset="-127"/>
-                <a:cs typeface="KoPubWorld돋움체_Pro Bold" panose="00000800000000000000" pitchFamily="50" charset="-127"/>
-              </a:rPr>
-              <a:t>Phase 1</a:t>
-            </a:r>
-            <a:endParaRPr lang="ko-KR" altLang="en-US" sz="1600" dirty="0">
-              <a:solidFill>
-                <a:srgbClr val="C00000"/>
-              </a:solidFill>
-              <a:latin typeface="KoPubWorld돋움체_Pro Bold" panose="00000800000000000000" pitchFamily="50" charset="-127"/>
-              <a:ea typeface="KoPubWorld돋움체_Pro Bold" panose="00000800000000000000" pitchFamily="50" charset="-127"/>
-              <a:cs typeface="KoPubWorld돋움체_Pro Bold" panose="00000800000000000000" pitchFamily="50" charset="-127"/>
-            </a:endParaRPr>
-          </a:p>
-        </p:txBody>
-      </p:sp>
-      <p:sp>
-        <p:nvSpPr>
-          <p:cNvPr id="18" name="TextBox 17">
-            <a:extLst>
-              <a:ext uri="{FF2B5EF4-FFF2-40B4-BE49-F238E27FC236}">
-                <a16:creationId xmlns:a16="http://schemas.microsoft.com/office/drawing/2014/main" id="{BA99009E-F3C0-7AE9-FA06-A9519F98413F}"/>
-              </a:ext>
-            </a:extLst>
-          </p:cNvPr>
-          <p:cNvSpPr txBox="1"/>
-          <p:nvPr/>
-        </p:nvSpPr>
-        <p:spPr>
-          <a:xfrm>
-            <a:off x="1930852" y="5411542"/>
-            <a:ext cx="1102179" cy="338554"/>
-          </a:xfrm>
-          <a:prstGeom prst="rect">
-            <a:avLst/>
-          </a:prstGeom>
-          <a:noFill/>
-        </p:spPr>
-        <p:txBody>
-          <a:bodyPr wrap="square" rtlCol="0">
-            <a:spAutoFit/>
-          </a:bodyPr>
-          <a:lstStyle/>
-          <a:p>
-            <a:pPr algn="ctr"/>
-            <a:r>
-              <a:rPr lang="en-US" altLang="ko-KR" sz="1600" dirty="0">
-                <a:solidFill>
-                  <a:srgbClr val="C00000"/>
-                </a:solidFill>
-                <a:latin typeface="KoPubWorld돋움체_Pro Bold" panose="00000800000000000000" pitchFamily="50" charset="-127"/>
-                <a:ea typeface="KoPubWorld돋움체_Pro Bold" panose="00000800000000000000" pitchFamily="50" charset="-127"/>
-                <a:cs typeface="KoPubWorld돋움체_Pro Bold" panose="00000800000000000000" pitchFamily="50" charset="-127"/>
-              </a:rPr>
-              <a:t>Phase 2</a:t>
-            </a:r>
-            <a:endParaRPr lang="ko-KR" altLang="en-US" sz="1600" dirty="0">
-              <a:solidFill>
-                <a:srgbClr val="C00000"/>
-              </a:solidFill>
-              <a:latin typeface="KoPubWorld돋움체_Pro Bold" panose="00000800000000000000" pitchFamily="50" charset="-127"/>
-              <a:ea typeface="KoPubWorld돋움체_Pro Bold" panose="00000800000000000000" pitchFamily="50" charset="-127"/>
-              <a:cs typeface="KoPubWorld돋움체_Pro Bold" panose="00000800000000000000" pitchFamily="50" charset="-127"/>
-            </a:endParaRPr>
-          </a:p>
-        </p:txBody>
-      </p:sp>
-      <p:sp>
-        <p:nvSpPr>
-          <p:cNvPr id="24" name="TextBox 23">
-            <a:extLst>
-              <a:ext uri="{FF2B5EF4-FFF2-40B4-BE49-F238E27FC236}">
-                <a16:creationId xmlns:a16="http://schemas.microsoft.com/office/drawing/2014/main" id="{B7377323-87E9-9D4A-605D-2D3BC8074FEB}"/>
-              </a:ext>
-            </a:extLst>
-          </p:cNvPr>
-          <p:cNvSpPr txBox="1"/>
-          <p:nvPr/>
-        </p:nvSpPr>
-        <p:spPr>
-          <a:xfrm>
-            <a:off x="5075121" y="1107904"/>
-            <a:ext cx="1102179" cy="338554"/>
-          </a:xfrm>
-          <a:prstGeom prst="rect">
-            <a:avLst/>
-          </a:prstGeom>
-          <a:noFill/>
-        </p:spPr>
-        <p:txBody>
-          <a:bodyPr wrap="square" rtlCol="0">
-            <a:spAutoFit/>
-          </a:bodyPr>
-          <a:lstStyle/>
-          <a:p>
-            <a:pPr algn="ctr"/>
-            <a:r>
-              <a:rPr lang="en-US" altLang="ko-KR" sz="1600" dirty="0">
-                <a:solidFill>
-                  <a:srgbClr val="C00000"/>
-                </a:solidFill>
-                <a:latin typeface="KoPubWorld돋움체_Pro Bold" panose="00000800000000000000" pitchFamily="50" charset="-127"/>
-                <a:ea typeface="KoPubWorld돋움체_Pro Bold" panose="00000800000000000000" pitchFamily="50" charset="-127"/>
-                <a:cs typeface="KoPubWorld돋움체_Pro Bold" panose="00000800000000000000" pitchFamily="50" charset="-127"/>
-              </a:rPr>
-              <a:t>Phase 4</a:t>
-            </a:r>
-            <a:endParaRPr lang="ko-KR" altLang="en-US" sz="1600" dirty="0">
-              <a:solidFill>
-                <a:srgbClr val="C00000"/>
-              </a:solidFill>
-              <a:latin typeface="KoPubWorld돋움체_Pro Bold" panose="00000800000000000000" pitchFamily="50" charset="-127"/>
-              <a:ea typeface="KoPubWorld돋움체_Pro Bold" panose="00000800000000000000" pitchFamily="50" charset="-127"/>
-              <a:cs typeface="KoPubWorld돋움체_Pro Bold" panose="00000800000000000000" pitchFamily="50" charset="-127"/>
-            </a:endParaRPr>
-          </a:p>
-        </p:txBody>
-      </p:sp>
     </p:spTree>
     <p:extLst>
       <p:ext uri="{BB962C8B-B14F-4D97-AF65-F5344CB8AC3E}">

</xml_diff>